<commit_message>
Trabajo al 10 de sept
Signed-off-by: Ricardo Bocaz L <rbocazl@gmail.com>
</commit_message>
<xml_diff>
--- a/Proyecto1/Dibujos.pptx
+++ b/Proyecto1/Dibujos.pptx
@@ -4051,7 +4051,7 @@
         <a:p>
           <a:r>
             <a:rPr lang="es-CL" dirty="0" smtClean="0"/>
-            <a:t>Análisis Inteligente de Datos</a:t>
+            <a:t>Data</a:t>
           </a:r>
           <a:endParaRPr lang="es-ES" dirty="0"/>
         </a:p>
@@ -4088,7 +4088,7 @@
         <a:p>
           <a:r>
             <a:rPr lang="es-CL" dirty="0" smtClean="0"/>
-            <a:t>ROLAP</a:t>
+            <a:t>OLAP</a:t>
           </a:r>
           <a:endParaRPr lang="es-ES" dirty="0"/>
         </a:p>
@@ -4777,7 +4777,7 @@
         <a:p>
           <a:r>
             <a:rPr lang="es-CL" dirty="0" smtClean="0"/>
-            <a:t>ROLAP</a:t>
+            <a:t>OLAP</a:t>
           </a:r>
           <a:endParaRPr lang="es-ES" dirty="0"/>
         </a:p>
@@ -5712,6 +5712,13 @@
         </dgm:presLayoutVars>
       </dgm:prSet>
       <dgm:spPr/>
+      <dgm:t>
+        <a:bodyPr/>
+        <a:lstStyle/>
+        <a:p>
+          <a:endParaRPr lang="es-ES"/>
+        </a:p>
+      </dgm:t>
     </dgm:pt>
     <dgm:pt modelId="{C15F5DCD-56EC-4F3F-ABB5-977FBB014C17}" type="pres">
       <dgm:prSet presAssocID="{29A31C2E-8131-4DBD-8561-634384C714CA}" presName="parTxOnly" presStyleLbl="node1" presStyleIdx="0" presStyleCnt="4">
@@ -5722,6 +5729,13 @@
         </dgm:presLayoutVars>
       </dgm:prSet>
       <dgm:spPr/>
+      <dgm:t>
+        <a:bodyPr/>
+        <a:lstStyle/>
+        <a:p>
+          <a:endParaRPr lang="es-ES"/>
+        </a:p>
+      </dgm:t>
     </dgm:pt>
     <dgm:pt modelId="{1F69068F-6B47-47C6-933A-96CF2CE7209B}" type="pres">
       <dgm:prSet presAssocID="{04E269DC-4F69-44B0-9387-709D215D02B8}" presName="parTxOnlySpace" presStyleCnt="0"/>
@@ -5757,6 +5771,13 @@
         </dgm:presLayoutVars>
       </dgm:prSet>
       <dgm:spPr/>
+      <dgm:t>
+        <a:bodyPr/>
+        <a:lstStyle/>
+        <a:p>
+          <a:endParaRPr lang="es-ES"/>
+        </a:p>
+      </dgm:t>
     </dgm:pt>
     <dgm:pt modelId="{0811B376-9540-48AC-91D7-8D5D56E5C18B}" type="pres">
       <dgm:prSet presAssocID="{158964CE-25A4-4563-9D30-648E810F6BE8}" presName="parTxOnlySpace" presStyleCnt="0"/>
@@ -5771,18 +5792,25 @@
         </dgm:presLayoutVars>
       </dgm:prSet>
       <dgm:spPr/>
+      <dgm:t>
+        <a:bodyPr/>
+        <a:lstStyle/>
+        <a:p>
+          <a:endParaRPr lang="es-ES"/>
+        </a:p>
+      </dgm:t>
     </dgm:pt>
   </dgm:ptLst>
   <dgm:cxnLst>
+    <dgm:cxn modelId="{08259063-2B91-4DE5-A047-3CAF5972F938}" type="presOf" srcId="{09CB2B69-BBC9-4723-BB91-78901E3BD86F}" destId="{E29F7972-CCD5-489E-8C31-A5215895B56E}" srcOrd="0" destOrd="0" presId="urn:microsoft.com/office/officeart/2005/8/layout/chevron1"/>
+    <dgm:cxn modelId="{0013CD03-9C0F-4740-B871-5BAA989439B2}" type="presOf" srcId="{C02CA07E-AE94-4328-AB83-E3D60C8FFCD6}" destId="{FF4E61BF-26B9-451E-840C-8491EABF2443}" srcOrd="0" destOrd="0" presId="urn:microsoft.com/office/officeart/2005/8/layout/chevron1"/>
+    <dgm:cxn modelId="{F8F38587-1D86-4355-955C-1E034D290D02}" srcId="{B39AE274-88E9-4D02-B618-CEF06D9423B4}" destId="{C02CA07E-AE94-4328-AB83-E3D60C8FFCD6}" srcOrd="2" destOrd="0" parTransId="{5C12DD10-D9A1-403B-875C-FFDEF65FFE66}" sibTransId="{158964CE-25A4-4563-9D30-648E810F6BE8}"/>
     <dgm:cxn modelId="{C201D423-404A-4F91-8F43-88D97CA9D5CD}" type="presOf" srcId="{29A31C2E-8131-4DBD-8561-634384C714CA}" destId="{C15F5DCD-56EC-4F3F-ABB5-977FBB014C17}" srcOrd="0" destOrd="0" presId="urn:microsoft.com/office/officeart/2005/8/layout/chevron1"/>
-    <dgm:cxn modelId="{0013CD03-9C0F-4740-B871-5BAA989439B2}" type="presOf" srcId="{C02CA07E-AE94-4328-AB83-E3D60C8FFCD6}" destId="{FF4E61BF-26B9-451E-840C-8491EABF2443}" srcOrd="0" destOrd="0" presId="urn:microsoft.com/office/officeart/2005/8/layout/chevron1"/>
-    <dgm:cxn modelId="{49CD22DE-1A6E-408C-AC15-C5AD3EE3FF5D}" srcId="{B39AE274-88E9-4D02-B618-CEF06D9423B4}" destId="{29A31C2E-8131-4DBD-8561-634384C714CA}" srcOrd="0" destOrd="0" parTransId="{3D6A97A6-BDA8-4453-99D2-3894480E69C8}" sibTransId="{04E269DC-4F69-44B0-9387-709D215D02B8}"/>
     <dgm:cxn modelId="{B1181CDE-A24B-470E-8EF0-FE2E90533E19}" srcId="{B39AE274-88E9-4D02-B618-CEF06D9423B4}" destId="{09CB2B69-BBC9-4723-BB91-78901E3BD86F}" srcOrd="3" destOrd="0" parTransId="{175693BE-6190-4D60-9495-197C4DA4B5AF}" sibTransId="{58750133-45D8-4D26-8D6B-F886FB38BE59}"/>
-    <dgm:cxn modelId="{20406E4C-4B03-413B-A588-87872241BBDC}" srcId="{B39AE274-88E9-4D02-B618-CEF06D9423B4}" destId="{E28EBCB6-BEF8-402D-8C24-2D62881489DA}" srcOrd="1" destOrd="0" parTransId="{46390026-4188-496D-B091-3C81BA217743}" sibTransId="{487FB87B-DE63-4C95-BA7E-EC3834AF951A}"/>
-    <dgm:cxn modelId="{F8F38587-1D86-4355-955C-1E034D290D02}" srcId="{B39AE274-88E9-4D02-B618-CEF06D9423B4}" destId="{C02CA07E-AE94-4328-AB83-E3D60C8FFCD6}" srcOrd="2" destOrd="0" parTransId="{5C12DD10-D9A1-403B-875C-FFDEF65FFE66}" sibTransId="{158964CE-25A4-4563-9D30-648E810F6BE8}"/>
     <dgm:cxn modelId="{B4044B3A-6A76-4EF2-AF80-E6FC6241B6ED}" type="presOf" srcId="{B39AE274-88E9-4D02-B618-CEF06D9423B4}" destId="{DF7CB088-8E6B-4523-AFEB-F3C807E08695}" srcOrd="0" destOrd="0" presId="urn:microsoft.com/office/officeart/2005/8/layout/chevron1"/>
     <dgm:cxn modelId="{B20C5FCB-8735-4A7C-A8B3-BB32DF91356C}" type="presOf" srcId="{E28EBCB6-BEF8-402D-8C24-2D62881489DA}" destId="{BEFACDB2-3BD8-49A7-9A03-C8E65B031E37}" srcOrd="0" destOrd="0" presId="urn:microsoft.com/office/officeart/2005/8/layout/chevron1"/>
-    <dgm:cxn modelId="{08259063-2B91-4DE5-A047-3CAF5972F938}" type="presOf" srcId="{09CB2B69-BBC9-4723-BB91-78901E3BD86F}" destId="{E29F7972-CCD5-489E-8C31-A5215895B56E}" srcOrd="0" destOrd="0" presId="urn:microsoft.com/office/officeart/2005/8/layout/chevron1"/>
+    <dgm:cxn modelId="{49CD22DE-1A6E-408C-AC15-C5AD3EE3FF5D}" srcId="{B39AE274-88E9-4D02-B618-CEF06D9423B4}" destId="{29A31C2E-8131-4DBD-8561-634384C714CA}" srcOrd="0" destOrd="0" parTransId="{3D6A97A6-BDA8-4453-99D2-3894480E69C8}" sibTransId="{04E269DC-4F69-44B0-9387-709D215D02B8}"/>
+    <dgm:cxn modelId="{20406E4C-4B03-413B-A588-87872241BBDC}" srcId="{B39AE274-88E9-4D02-B618-CEF06D9423B4}" destId="{E28EBCB6-BEF8-402D-8C24-2D62881489DA}" srcOrd="1" destOrd="0" parTransId="{46390026-4188-496D-B091-3C81BA217743}" sibTransId="{487FB87B-DE63-4C95-BA7E-EC3834AF951A}"/>
     <dgm:cxn modelId="{7C3F9A73-0F12-4942-AC74-152D199AC9AF}" type="presParOf" srcId="{DF7CB088-8E6B-4523-AFEB-F3C807E08695}" destId="{C15F5DCD-56EC-4F3F-ABB5-977FBB014C17}" srcOrd="0" destOrd="0" presId="urn:microsoft.com/office/officeart/2005/8/layout/chevron1"/>
     <dgm:cxn modelId="{DD693D35-7FDE-461A-ACBC-113A16015EAD}" type="presParOf" srcId="{DF7CB088-8E6B-4523-AFEB-F3C807E08695}" destId="{1F69068F-6B47-47C6-933A-96CF2CE7209B}" srcOrd="1" destOrd="0" presId="urn:microsoft.com/office/officeart/2005/8/layout/chevron1"/>
     <dgm:cxn modelId="{F7892BBB-AB7A-4D60-8A00-A0A78C4A5A47}" type="presParOf" srcId="{DF7CB088-8E6B-4523-AFEB-F3C807E08695}" destId="{BEFACDB2-3BD8-49A7-9A03-C8E65B031E37}" srcOrd="2" destOrd="0" presId="urn:microsoft.com/office/officeart/2005/8/layout/chevron1"/>
@@ -6051,6 +6079,13 @@
         </dgm:presLayoutVars>
       </dgm:prSet>
       <dgm:spPr/>
+      <dgm:t>
+        <a:bodyPr/>
+        <a:lstStyle/>
+        <a:p>
+          <a:endParaRPr lang="es-ES"/>
+        </a:p>
+      </dgm:t>
     </dgm:pt>
     <dgm:pt modelId="{21DB49D4-111D-4CFF-8BCE-6BC876BE8843}" type="pres">
       <dgm:prSet presAssocID="{0866C1D8-0EB1-4A7C-B0DB-66D375E80775}" presName="singleCycle" presStyleCnt="0"/>
@@ -6075,6 +6110,13 @@
     <dgm:pt modelId="{6C56E18D-DC06-476D-9758-9F04B258FDC2}" type="pres">
       <dgm:prSet presAssocID="{886B259E-788A-4A2B-9B89-FE718F68A6F7}" presName="Name56" presStyleLbl="parChTrans1D2" presStyleIdx="0" presStyleCnt="5"/>
       <dgm:spPr/>
+      <dgm:t>
+        <a:bodyPr/>
+        <a:lstStyle/>
+        <a:p>
+          <a:endParaRPr lang="es-ES"/>
+        </a:p>
+      </dgm:t>
     </dgm:pt>
     <dgm:pt modelId="{5456A74F-A497-4176-87A2-6211B27F46D6}" type="pres">
       <dgm:prSet presAssocID="{77E64E07-8C40-4EAA-8FB6-C7B7D11A9B81}" presName="text0" presStyleLbl="node1" presStyleIdx="1" presStyleCnt="6">
@@ -6083,10 +6125,24 @@
         </dgm:presLayoutVars>
       </dgm:prSet>
       <dgm:spPr/>
+      <dgm:t>
+        <a:bodyPr/>
+        <a:lstStyle/>
+        <a:p>
+          <a:endParaRPr lang="es-ES"/>
+        </a:p>
+      </dgm:t>
     </dgm:pt>
     <dgm:pt modelId="{33DDBF13-55C2-4C6A-B90D-9F8767E7887B}" type="pres">
       <dgm:prSet presAssocID="{A3594A3E-F6C1-446E-9092-E8B2DDF852DA}" presName="Name56" presStyleLbl="parChTrans1D2" presStyleIdx="1" presStyleCnt="5"/>
       <dgm:spPr/>
+      <dgm:t>
+        <a:bodyPr/>
+        <a:lstStyle/>
+        <a:p>
+          <a:endParaRPr lang="es-ES"/>
+        </a:p>
+      </dgm:t>
     </dgm:pt>
     <dgm:pt modelId="{BDEA6C7F-FAC2-460C-8AF5-286C8D785ABA}" type="pres">
       <dgm:prSet presAssocID="{C6E18B65-3644-41B7-9C2A-40A718B507BF}" presName="text0" presStyleLbl="node1" presStyleIdx="2" presStyleCnt="6">
@@ -6095,10 +6151,24 @@
         </dgm:presLayoutVars>
       </dgm:prSet>
       <dgm:spPr/>
+      <dgm:t>
+        <a:bodyPr/>
+        <a:lstStyle/>
+        <a:p>
+          <a:endParaRPr lang="es-ES"/>
+        </a:p>
+      </dgm:t>
     </dgm:pt>
     <dgm:pt modelId="{B740E234-2340-40C1-AEDD-9B9B4A30F058}" type="pres">
       <dgm:prSet presAssocID="{C1A37336-8800-450D-9D9B-69634350DC19}" presName="Name56" presStyleLbl="parChTrans1D2" presStyleIdx="2" presStyleCnt="5"/>
       <dgm:spPr/>
+      <dgm:t>
+        <a:bodyPr/>
+        <a:lstStyle/>
+        <a:p>
+          <a:endParaRPr lang="es-ES"/>
+        </a:p>
+      </dgm:t>
     </dgm:pt>
     <dgm:pt modelId="{33B5AF32-7361-455D-8CBE-8348F1ECBDD4}" type="pres">
       <dgm:prSet presAssocID="{EFCE51D9-7C5A-4A17-8896-95861CD91BB5}" presName="text0" presStyleLbl="node1" presStyleIdx="3" presStyleCnt="6">
@@ -6107,10 +6177,24 @@
         </dgm:presLayoutVars>
       </dgm:prSet>
       <dgm:spPr/>
+      <dgm:t>
+        <a:bodyPr/>
+        <a:lstStyle/>
+        <a:p>
+          <a:endParaRPr lang="es-ES"/>
+        </a:p>
+      </dgm:t>
     </dgm:pt>
     <dgm:pt modelId="{42F4BBB9-FE5D-4A8D-BBF2-37DA0312C6D9}" type="pres">
       <dgm:prSet presAssocID="{6A563FBB-DB79-46E2-B2DB-618AC8AED2B7}" presName="Name56" presStyleLbl="parChTrans1D2" presStyleIdx="3" presStyleCnt="5"/>
       <dgm:spPr/>
+      <dgm:t>
+        <a:bodyPr/>
+        <a:lstStyle/>
+        <a:p>
+          <a:endParaRPr lang="es-ES"/>
+        </a:p>
+      </dgm:t>
     </dgm:pt>
     <dgm:pt modelId="{DBAF89DD-AC51-49EF-A997-E939CA7FBAB7}" type="pres">
       <dgm:prSet presAssocID="{73E1FEFB-7712-453D-84CF-CF8575B5B848}" presName="text0" presStyleLbl="node1" presStyleIdx="4" presStyleCnt="6">
@@ -6119,10 +6203,24 @@
         </dgm:presLayoutVars>
       </dgm:prSet>
       <dgm:spPr/>
+      <dgm:t>
+        <a:bodyPr/>
+        <a:lstStyle/>
+        <a:p>
+          <a:endParaRPr lang="es-ES"/>
+        </a:p>
+      </dgm:t>
     </dgm:pt>
     <dgm:pt modelId="{043E610A-4800-4A30-BF63-23A8B6ED5B35}" type="pres">
       <dgm:prSet presAssocID="{BA57DE36-EB88-47DC-BA34-183AA63FD6E1}" presName="Name56" presStyleLbl="parChTrans1D2" presStyleIdx="4" presStyleCnt="5"/>
       <dgm:spPr/>
+      <dgm:t>
+        <a:bodyPr/>
+        <a:lstStyle/>
+        <a:p>
+          <a:endParaRPr lang="es-ES"/>
+        </a:p>
+      </dgm:t>
     </dgm:pt>
     <dgm:pt modelId="{92913CBB-1DD6-4347-9E1D-BCC75E6B0402}" type="pres">
       <dgm:prSet presAssocID="{0593859E-F4AC-44E5-9945-34356FEADA66}" presName="text0" presStyleLbl="node1" presStyleIdx="5" presStyleCnt="6">
@@ -6142,8 +6240,8 @@
   </dgm:ptLst>
   <dgm:cxnLst>
     <dgm:cxn modelId="{1109C2E6-A444-4802-83D8-389C0A08C4D1}" type="presOf" srcId="{EFCE51D9-7C5A-4A17-8896-95861CD91BB5}" destId="{33B5AF32-7361-455D-8CBE-8348F1ECBDD4}" srcOrd="0" destOrd="0" presId="urn:microsoft.com/office/officeart/2008/layout/RadialCluster"/>
+    <dgm:cxn modelId="{91E21F17-FB7B-4923-942C-6D1EDB104964}" srcId="{0866C1D8-0EB1-4A7C-B0DB-66D375E80775}" destId="{C6E18B65-3644-41B7-9C2A-40A718B507BF}" srcOrd="1" destOrd="0" parTransId="{A3594A3E-F6C1-446E-9092-E8B2DDF852DA}" sibTransId="{EA742C1A-964D-41E0-95D5-594F8CE76B0D}"/>
     <dgm:cxn modelId="{22C115EC-B7FB-445B-930C-32CFF258CF58}" type="presOf" srcId="{C1A37336-8800-450D-9D9B-69634350DC19}" destId="{B740E234-2340-40C1-AEDD-9B9B4A30F058}" srcOrd="0" destOrd="0" presId="urn:microsoft.com/office/officeart/2008/layout/RadialCluster"/>
-    <dgm:cxn modelId="{91E21F17-FB7B-4923-942C-6D1EDB104964}" srcId="{0866C1D8-0EB1-4A7C-B0DB-66D375E80775}" destId="{C6E18B65-3644-41B7-9C2A-40A718B507BF}" srcOrd="1" destOrd="0" parTransId="{A3594A3E-F6C1-446E-9092-E8B2DDF852DA}" sibTransId="{EA742C1A-964D-41E0-95D5-594F8CE76B0D}"/>
     <dgm:cxn modelId="{901F5F44-093A-45FC-AD32-B71E72D8BDA5}" srcId="{0866C1D8-0EB1-4A7C-B0DB-66D375E80775}" destId="{EFCE51D9-7C5A-4A17-8896-95861CD91BB5}" srcOrd="2" destOrd="0" parTransId="{C1A37336-8800-450D-9D9B-69634350DC19}" sibTransId="{EE70FB35-C001-4E77-8116-4CF6568EB62E}"/>
     <dgm:cxn modelId="{31DD82A8-7855-4AA6-B7AE-62133EA476AF}" type="presOf" srcId="{6A563FBB-DB79-46E2-B2DB-618AC8AED2B7}" destId="{42F4BBB9-FE5D-4A8D-BBF2-37DA0312C6D9}" srcOrd="0" destOrd="0" presId="urn:microsoft.com/office/officeart/2008/layout/RadialCluster"/>
     <dgm:cxn modelId="{AABB86A5-8C45-49EC-B40D-040873D682AE}" type="presOf" srcId="{886B259E-788A-4A2B-9B89-FE718F68A6F7}" destId="{6C56E18D-DC06-476D-9758-9F04B258FDC2}" srcOrd="0" destOrd="0" presId="urn:microsoft.com/office/officeart/2008/layout/RadialCluster"/>
@@ -6152,8 +6250,8 @@
     <dgm:cxn modelId="{0545C70D-EFB0-41B7-BCF3-B67C624A031F}" type="presOf" srcId="{BA57DE36-EB88-47DC-BA34-183AA63FD6E1}" destId="{043E610A-4800-4A30-BF63-23A8B6ED5B35}" srcOrd="0" destOrd="0" presId="urn:microsoft.com/office/officeart/2008/layout/RadialCluster"/>
     <dgm:cxn modelId="{B4CE5DE0-2F59-4AF8-95A6-A1A0304F0722}" type="presOf" srcId="{C9C42D90-DF62-490F-B3E9-4DF4CF826DDA}" destId="{A146892C-89C1-46DB-897A-8BFB1DDDAD30}" srcOrd="0" destOrd="0" presId="urn:microsoft.com/office/officeart/2008/layout/RadialCluster"/>
     <dgm:cxn modelId="{2C22AE24-C7D1-4E6E-A780-990E5187BD75}" srcId="{C9C42D90-DF62-490F-B3E9-4DF4CF826DDA}" destId="{0866C1D8-0EB1-4A7C-B0DB-66D375E80775}" srcOrd="0" destOrd="0" parTransId="{80AA62EA-9531-426F-AAA4-7FDCD38835CA}" sibTransId="{48FECE92-F794-47D2-AFE9-AADBBFFE5845}"/>
+    <dgm:cxn modelId="{D644FE85-E16E-440F-853A-08846CC79292}" type="presOf" srcId="{0593859E-F4AC-44E5-9945-34356FEADA66}" destId="{92913CBB-1DD6-4347-9E1D-BCC75E6B0402}" srcOrd="0" destOrd="0" presId="urn:microsoft.com/office/officeart/2008/layout/RadialCluster"/>
     <dgm:cxn modelId="{C10D097D-D581-4B45-82C9-1B262594BDBE}" srcId="{0866C1D8-0EB1-4A7C-B0DB-66D375E80775}" destId="{0593859E-F4AC-44E5-9945-34356FEADA66}" srcOrd="4" destOrd="0" parTransId="{BA57DE36-EB88-47DC-BA34-183AA63FD6E1}" sibTransId="{DB925DA4-9FCE-48E8-B687-8949D8EA36F2}"/>
-    <dgm:cxn modelId="{D644FE85-E16E-440F-853A-08846CC79292}" type="presOf" srcId="{0593859E-F4AC-44E5-9945-34356FEADA66}" destId="{92913CBB-1DD6-4347-9E1D-BCC75E6B0402}" srcOrd="0" destOrd="0" presId="urn:microsoft.com/office/officeart/2008/layout/RadialCluster"/>
     <dgm:cxn modelId="{5EFCE9A1-0434-43B9-B4E3-C74E29D8870D}" type="presOf" srcId="{A3594A3E-F6C1-446E-9092-E8B2DDF852DA}" destId="{33DDBF13-55C2-4C6A-B90D-9F8767E7887B}" srcOrd="0" destOrd="0" presId="urn:microsoft.com/office/officeart/2008/layout/RadialCluster"/>
     <dgm:cxn modelId="{259D0338-10E6-4214-BCB8-E9935C6B171D}" type="presOf" srcId="{73E1FEFB-7712-453D-84CF-CF8575B5B848}" destId="{DBAF89DD-AC51-49EF-A997-E939CA7FBAB7}" srcOrd="0" destOrd="0" presId="urn:microsoft.com/office/officeart/2008/layout/RadialCluster"/>
     <dgm:cxn modelId="{81C3699E-6074-438C-B98F-90937BD7F621}" srcId="{0866C1D8-0EB1-4A7C-B0DB-66D375E80775}" destId="{77E64E07-8C40-4EAA-8FB6-C7B7D11A9B81}" srcOrd="0" destOrd="0" parTransId="{886B259E-788A-4A2B-9B89-FE718F68A6F7}" sibTransId="{494EE391-1715-46CD-B277-512E9E6964E8}"/>
@@ -6424,12 +6522,12 @@
         </a:fontRef>
       </dsp:style>
       <dsp:txBody>
-        <a:bodyPr spcFirstLastPara="0" vert="horz" wrap="square" lIns="24130" tIns="24130" rIns="24130" bIns="24130" numCol="1" spcCol="1270" anchor="ctr" anchorCtr="0">
+        <a:bodyPr spcFirstLastPara="0" vert="horz" wrap="square" lIns="53340" tIns="53340" rIns="53340" bIns="53340" numCol="1" spcCol="1270" anchor="ctr" anchorCtr="0">
           <a:noAutofit/>
         </a:bodyPr>
         <a:lstStyle/>
         <a:p>
-          <a:pPr lvl="0" algn="ctr" defTabSz="844550">
+          <a:pPr lvl="0" algn="ctr" defTabSz="1866900">
             <a:lnSpc>
               <a:spcPct val="90000"/>
             </a:lnSpc>
@@ -6441,10 +6539,10 @@
             </a:spcAft>
           </a:pPr>
           <a:r>
-            <a:rPr lang="es-CL" sz="1900" kern="1200" dirty="0" smtClean="0"/>
-            <a:t>Análisis Inteligente de Datos</a:t>
+            <a:rPr lang="es-CL" sz="4200" kern="1200" dirty="0" smtClean="0"/>
+            <a:t>Data</a:t>
           </a:r>
-          <a:endParaRPr lang="es-ES" sz="1900" kern="1200" dirty="0"/>
+          <a:endParaRPr lang="es-ES" sz="4200" kern="1200" dirty="0"/>
         </a:p>
       </dsp:txBody>
       <dsp:txXfrm>
@@ -6520,7 +6618,7 @@
           </a:pPr>
           <a:r>
             <a:rPr lang="es-CL" sz="900" kern="1200" dirty="0" smtClean="0"/>
-            <a:t>ROLAP</a:t>
+            <a:t>OLAP</a:t>
           </a:r>
           <a:endParaRPr lang="es-ES" sz="900" kern="1200" dirty="0"/>
         </a:p>
@@ -7158,7 +7256,7 @@
           </a:pPr>
           <a:r>
             <a:rPr lang="es-CL" sz="1400" kern="1200" dirty="0" smtClean="0"/>
-            <a:t>ROLAP</a:t>
+            <a:t>OLAP</a:t>
           </a:r>
           <a:endParaRPr lang="es-ES" sz="1400" kern="1200" dirty="0"/>
         </a:p>
@@ -19203,7 +19301,7 @@
           <a:p>
             <a:fld id="{435B8139-5F63-4211-A78E-86EABFCAEA0F}" type="datetimeFigureOut">
               <a:rPr lang="es-ES" smtClean="0"/>
-              <a:t>10/09/2011</a:t>
+              <a:t>11/09/2011</a:t>
             </a:fld>
             <a:endParaRPr lang="es-ES"/>
           </a:p>
@@ -19373,7 +19471,7 @@
           <a:p>
             <a:fld id="{435B8139-5F63-4211-A78E-86EABFCAEA0F}" type="datetimeFigureOut">
               <a:rPr lang="es-ES" smtClean="0"/>
-              <a:t>10/09/2011</a:t>
+              <a:t>11/09/2011</a:t>
             </a:fld>
             <a:endParaRPr lang="es-ES"/>
           </a:p>
@@ -19553,7 +19651,7 @@
           <a:p>
             <a:fld id="{435B8139-5F63-4211-A78E-86EABFCAEA0F}" type="datetimeFigureOut">
               <a:rPr lang="es-ES" smtClean="0"/>
-              <a:t>10/09/2011</a:t>
+              <a:t>11/09/2011</a:t>
             </a:fld>
             <a:endParaRPr lang="es-ES"/>
           </a:p>
@@ -19723,7 +19821,7 @@
           <a:p>
             <a:fld id="{435B8139-5F63-4211-A78E-86EABFCAEA0F}" type="datetimeFigureOut">
               <a:rPr lang="es-ES" smtClean="0"/>
-              <a:t>10/09/2011</a:t>
+              <a:t>11/09/2011</a:t>
             </a:fld>
             <a:endParaRPr lang="es-ES"/>
           </a:p>
@@ -19969,7 +20067,7 @@
           <a:p>
             <a:fld id="{435B8139-5F63-4211-A78E-86EABFCAEA0F}" type="datetimeFigureOut">
               <a:rPr lang="es-ES" smtClean="0"/>
-              <a:t>10/09/2011</a:t>
+              <a:t>11/09/2011</a:t>
             </a:fld>
             <a:endParaRPr lang="es-ES"/>
           </a:p>
@@ -20257,7 +20355,7 @@
           <a:p>
             <a:fld id="{435B8139-5F63-4211-A78E-86EABFCAEA0F}" type="datetimeFigureOut">
               <a:rPr lang="es-ES" smtClean="0"/>
-              <a:t>10/09/2011</a:t>
+              <a:t>11/09/2011</a:t>
             </a:fld>
             <a:endParaRPr lang="es-ES"/>
           </a:p>
@@ -20679,7 +20777,7 @@
           <a:p>
             <a:fld id="{435B8139-5F63-4211-A78E-86EABFCAEA0F}" type="datetimeFigureOut">
               <a:rPr lang="es-ES" smtClean="0"/>
-              <a:t>10/09/2011</a:t>
+              <a:t>11/09/2011</a:t>
             </a:fld>
             <a:endParaRPr lang="es-ES"/>
           </a:p>
@@ -20797,7 +20895,7 @@
           <a:p>
             <a:fld id="{435B8139-5F63-4211-A78E-86EABFCAEA0F}" type="datetimeFigureOut">
               <a:rPr lang="es-ES" smtClean="0"/>
-              <a:t>10/09/2011</a:t>
+              <a:t>11/09/2011</a:t>
             </a:fld>
             <a:endParaRPr lang="es-ES"/>
           </a:p>
@@ -20892,7 +20990,7 @@
           <a:p>
             <a:fld id="{435B8139-5F63-4211-A78E-86EABFCAEA0F}" type="datetimeFigureOut">
               <a:rPr lang="es-ES" smtClean="0"/>
-              <a:t>10/09/2011</a:t>
+              <a:t>11/09/2011</a:t>
             </a:fld>
             <a:endParaRPr lang="es-ES"/>
           </a:p>
@@ -21169,7 +21267,7 @@
           <a:p>
             <a:fld id="{435B8139-5F63-4211-A78E-86EABFCAEA0F}" type="datetimeFigureOut">
               <a:rPr lang="es-ES" smtClean="0"/>
-              <a:t>10/09/2011</a:t>
+              <a:t>11/09/2011</a:t>
             </a:fld>
             <a:endParaRPr lang="es-ES"/>
           </a:p>
@@ -21422,7 +21520,7 @@
           <a:p>
             <a:fld id="{435B8139-5F63-4211-A78E-86EABFCAEA0F}" type="datetimeFigureOut">
               <a:rPr lang="es-ES" smtClean="0"/>
-              <a:t>10/09/2011</a:t>
+              <a:t>11/09/2011</a:t>
             </a:fld>
             <a:endParaRPr lang="es-ES"/>
           </a:p>
@@ -21635,7 +21733,7 @@
           <a:p>
             <a:fld id="{435B8139-5F63-4211-A78E-86EABFCAEA0F}" type="datetimeFigureOut">
               <a:rPr lang="es-ES" smtClean="0"/>
-              <a:t>10/09/2011</a:t>
+              <a:t>11/09/2011</a:t>
             </a:fld>
             <a:endParaRPr lang="es-ES"/>
           </a:p>
@@ -22107,7 +22205,7 @@
             <p:ph idx="1"/>
             <p:extLst>
               <p:ext uri="{D42A27DB-BD31-4B8C-83A1-F6EECF244321}">
-                <p14:modId xmlns:p14="http://schemas.microsoft.com/office/powerpoint/2010/main" val="2785349002"/>
+                <p14:modId xmlns:p14="http://schemas.microsoft.com/office/powerpoint/2010/main" val="1575379763"/>
               </p:ext>
             </p:extLst>
           </p:nvPr>
@@ -22181,7 +22279,7 @@
             <p:ph idx="1"/>
             <p:extLst>
               <p:ext uri="{D42A27DB-BD31-4B8C-83A1-F6EECF244321}">
-                <p14:modId xmlns:p14="http://schemas.microsoft.com/office/powerpoint/2010/main" val="3322721790"/>
+                <p14:modId xmlns:p14="http://schemas.microsoft.com/office/powerpoint/2010/main" val="408323094"/>
               </p:ext>
             </p:extLst>
           </p:nvPr>

</xml_diff>